<commit_message>
uploading solutions for week 4
</commit_message>
<xml_diff>
--- a/Week 4/wk4_PHYS3116_2025T3_spotted_python_slides.pptx
+++ b/Week 4/wk4_PHYS3116_2025T3_spotted_python_slides.pptx
@@ -8867,8 +8867,8 @@
         </p:nvSpPr>
         <p:spPr>
           <a:xfrm>
-            <a:off x="10017457" y="5103674"/>
-            <a:ext cx="2174543" cy="1754326"/>
+            <a:off x="10017457" y="5657671"/>
+            <a:ext cx="2174543" cy="1200329"/>
           </a:xfrm>
           <a:prstGeom prst="rect">
             <a:avLst/>
@@ -9064,17 +9064,6 @@
               <a:t>Creating subplots</a:t>
             </a:r>
           </a:p>
-          <a:p>
-            <a:pPr marL="285750" indent="-285750">
-              <a:buBlip>
-                <a:blip r:embed="rId2"/>
-              </a:buBlip>
-            </a:pPr>
-            <a:r>
-              <a:rPr lang="en-US" dirty="0"/>
-              <a:t>Table manipulation</a:t>
-            </a:r>
-          </a:p>
         </p:txBody>
       </p:sp>
     </p:spTree>
@@ -9581,6 +9570,10 @@
                   <a:rPr lang="en-US" dirty="0"/>
                   <a:t>, 2007)</a:t>
                 </a:r>
+                <a:br>
+                  <a:rPr lang="en-US" dirty="0"/>
+                </a:br>
+                <a:endParaRPr lang="en-US" dirty="0"/>
               </a:p>
               <a:p>
                 <a:pPr>
@@ -9592,15 +9585,140 @@
                       <m:jc m:val="centerGroup"/>
                     </m:oMathParaPr>
                     <m:oMath xmlns:m="http://schemas.openxmlformats.org/officeDocument/2006/math">
-                      <a:fld id="{825F15A7-03F4-43D7-82C5-3E23DA2F108C}" type="mathplaceholder">
-                        <a:rPr lang="en-US" i="1" smtClean="0">
+                      <m:sSub>
+                        <m:sSubPr>
+                          <m:ctrlPr>
+                            <a:rPr lang="en-AU" b="0" i="1" smtClean="0">
+                              <a:latin typeface="Cambria Math" panose="02040503050406030204" pitchFamily="18" charset="0"/>
+                            </a:rPr>
+                          </m:ctrlPr>
+                        </m:sSubPr>
+                        <m:e>
+                          <m:d>
+                            <m:dPr>
+                              <m:ctrlPr>
+                                <a:rPr lang="en-AU" b="0" i="1" smtClean="0">
+                                  <a:latin typeface="Cambria Math" panose="02040503050406030204" pitchFamily="18" charset="0"/>
+                                </a:rPr>
+                              </m:ctrlPr>
+                            </m:dPr>
+                            <m:e>
+                              <m:f>
+                                <m:fPr>
+                                  <m:ctrlPr>
+                                    <a:rPr lang="en-AU" b="0" i="1" smtClean="0">
+                                      <a:latin typeface="Cambria Math" panose="02040503050406030204" pitchFamily="18" charset="0"/>
+                                    </a:rPr>
+                                  </m:ctrlPr>
+                                </m:fPr>
+                                <m:num>
+                                  <m:r>
+                                    <a:rPr lang="en-AU" b="0" i="1" smtClean="0">
+                                      <a:latin typeface="Cambria Math" panose="02040503050406030204" pitchFamily="18" charset="0"/>
+                                    </a:rPr>
+                                    <m:t>𝑉</m:t>
+                                  </m:r>
+                                </m:num>
+                                <m:den>
+                                  <m:r>
+                                    <a:rPr lang="en-AU" b="0" i="1" smtClean="0">
+                                      <a:latin typeface="Cambria Math" panose="02040503050406030204" pitchFamily="18" charset="0"/>
+                                    </a:rPr>
+                                    <m:t>𝜎</m:t>
+                                  </m:r>
+                                </m:den>
+                              </m:f>
+                            </m:e>
+                          </m:d>
+                        </m:e>
+                        <m:sub>
+                          <m:r>
+                            <a:rPr lang="en-AU" b="0" i="1" smtClean="0">
+                              <a:latin typeface="Cambria Math" panose="02040503050406030204" pitchFamily="18" charset="0"/>
+                            </a:rPr>
+                            <m:t>𝑒</m:t>
+                          </m:r>
+                        </m:sub>
+                      </m:sSub>
+                      <m:r>
+                        <a:rPr lang="en-AU" b="0" i="1" smtClean="0">
                           <a:latin typeface="Cambria Math" panose="02040503050406030204" pitchFamily="18" charset="0"/>
                         </a:rPr>
-                        <a:t>Type equation here.</a:t>
-                      </a:fld>
+                        <m:t>=</m:t>
+                      </m:r>
+                      <m:rad>
+                        <m:radPr>
+                          <m:degHide m:val="on"/>
+                          <m:ctrlPr>
+                            <a:rPr lang="en-AU" b="0" i="1" smtClean="0">
+                              <a:latin typeface="Cambria Math" panose="02040503050406030204" pitchFamily="18" charset="0"/>
+                            </a:rPr>
+                          </m:ctrlPr>
+                        </m:radPr>
+                        <m:deg/>
+                        <m:e>
+                          <m:f>
+                            <m:fPr>
+                              <m:ctrlPr>
+                                <a:rPr lang="en-AU" b="0" i="1" smtClean="0">
+                                  <a:latin typeface="Cambria Math" panose="02040503050406030204" pitchFamily="18" charset="0"/>
+                                </a:rPr>
+                              </m:ctrlPr>
+                            </m:fPr>
+                            <m:num>
+                              <m:d>
+                                <m:dPr>
+                                  <m:ctrlPr>
+                                    <a:rPr lang="en-AU" b="0" i="1" smtClean="0">
+                                      <a:latin typeface="Cambria Math" panose="02040503050406030204" pitchFamily="18" charset="0"/>
+                                    </a:rPr>
+                                  </m:ctrlPr>
+                                </m:dPr>
+                                <m:e>
+                                  <m:r>
+                                    <a:rPr lang="en-AU" b="0" i="1" smtClean="0">
+                                      <a:latin typeface="Cambria Math" panose="02040503050406030204" pitchFamily="18" charset="0"/>
+                                    </a:rPr>
+                                    <m:t>0.09+0.1</m:t>
+                                  </m:r>
+                                  <m:r>
+                                    <a:rPr lang="en-AU" b="0" i="1" smtClean="0">
+                                      <a:latin typeface="Cambria Math" panose="02040503050406030204" pitchFamily="18" charset="0"/>
+                                    </a:rPr>
+                                    <m:t>𝜖</m:t>
+                                  </m:r>
+                                </m:e>
+                              </m:d>
+                              <m:r>
+                                <a:rPr lang="en-AU" b="0" i="1" smtClean="0">
+                                  <a:latin typeface="Cambria Math" panose="02040503050406030204" pitchFamily="18" charset="0"/>
+                                </a:rPr>
+                                <m:t>𝜖</m:t>
+                              </m:r>
+                            </m:num>
+                            <m:den>
+                              <m:r>
+                                <a:rPr lang="en-AU" b="0" i="1" smtClean="0">
+                                  <a:latin typeface="Cambria Math" panose="02040503050406030204" pitchFamily="18" charset="0"/>
+                                </a:rPr>
+                                <m:t>1−</m:t>
+                              </m:r>
+                              <m:r>
+                                <a:rPr lang="en-AU" b="0" i="1" smtClean="0">
+                                  <a:latin typeface="Cambria Math" panose="02040503050406030204" pitchFamily="18" charset="0"/>
+                                </a:rPr>
+                                <m:t>𝜖</m:t>
+                              </m:r>
+                            </m:den>
+                          </m:f>
+                        </m:e>
+                      </m:rad>
                     </m:oMath>
                   </m:oMathPara>
                 </a14:m>
+                <a:br>
+                  <a:rPr lang="en-AU" dirty="0"/>
+                </a:br>
                 <a:endParaRPr lang="en-US" dirty="0"/>
               </a:p>
               <a:p>
@@ -9611,7 +9729,11 @@
                 </a:pPr>
                 <a:r>
                   <a:rPr lang="en-US" dirty="0"/>
-                  <a:t>Try to recreate this figure from van de Sande, 2017</a:t>
+                  <a:t>Try to recreate this figure from van de Sande, 2017 </a:t>
+                </a:r>
+                <a:r>
+                  <a:rPr lang="en-US" b="1" dirty="0"/>
+                  <a:t>(Exercise 2)</a:t>
                 </a:r>
               </a:p>
             </p:txBody>
@@ -9684,8 +9806,8 @@
         </p:blipFill>
         <p:spPr>
           <a:xfrm>
-            <a:off x="4319173" y="2842852"/>
-            <a:ext cx="3553654" cy="3442332"/>
+            <a:off x="4400296" y="3572831"/>
+            <a:ext cx="3391408" cy="3285169"/>
           </a:xfrm>
           <a:prstGeom prst="rect">
             <a:avLst/>

</xml_diff>